<commit_message>
Minor changes to design exercises
- Removed Appropriateness data set from slide in design exercise 4
- Added proper link to source of a visualization to slide in design exercise 1
</commit_message>
<xml_diff>
--- a/assets/exercise-materials/design-exercise-4.pptx
+++ b/assets/exercise-materials/design-exercise-4.pptx
@@ -5,16 +5,15 @@
     <p:sldMasterId id="2147483738" r:id="rId4"/>
   </p:sldMasterIdLst>
   <p:notesMasterIdLst>
-    <p:notesMasterId r:id="rId12"/>
+    <p:notesMasterId r:id="rId11"/>
   </p:notesMasterIdLst>
   <p:sldIdLst>
     <p:sldId id="272" r:id="rId5"/>
     <p:sldId id="257" r:id="rId6"/>
     <p:sldId id="265" r:id="rId7"/>
-    <p:sldId id="271" r:id="rId8"/>
-    <p:sldId id="270" r:id="rId9"/>
-    <p:sldId id="266" r:id="rId10"/>
-    <p:sldId id="264" r:id="rId11"/>
+    <p:sldId id="270" r:id="rId8"/>
+    <p:sldId id="266" r:id="rId9"/>
+    <p:sldId id="264" r:id="rId10"/>
   </p:sldIdLst>
   <p:sldSz cx="12192000" cy="6858000"/>
   <p:notesSz cx="6858000" cy="9144000"/>
@@ -208,7 +207,7 @@
           </a:lstStyle>
           <a:p>
             <a:fld id="{5A45714A-8C13-4AA6-AC6C-1A1687B0542C}" type="datetimeFigureOut">
-              <a:t>13/01/2024</a:t>
+              <a:t>14/01/2024</a:t>
             </a:fld>
             <a:endParaRPr lang="en-GB"/>
           </a:p>
@@ -809,7 +808,7 @@
           <a:p>
             <a:fld id="{C485584D-7D79-4248-9986-4CA35242F944}" type="datetimeFigureOut">
               <a:rPr lang="en-US" smtClean="0"/>
-              <a:t>1/13/24</a:t>
+              <a:t>1/14/24</a:t>
             </a:fld>
             <a:endParaRPr lang="en-US"/>
           </a:p>
@@ -1184,7 +1183,7 @@
           <a:p>
             <a:fld id="{C485584D-7D79-4248-9986-4CA35242F944}" type="datetimeFigureOut">
               <a:rPr lang="en-US" smtClean="0"/>
-              <a:t>1/13/24</a:t>
+              <a:t>1/14/24</a:t>
             </a:fld>
             <a:endParaRPr lang="en-US"/>
           </a:p>
@@ -1393,7 +1392,7 @@
           <a:p>
             <a:fld id="{C485584D-7D79-4248-9986-4CA35242F944}" type="datetimeFigureOut">
               <a:rPr lang="en-US" smtClean="0"/>
-              <a:t>1/13/24</a:t>
+              <a:t>1/14/24</a:t>
             </a:fld>
             <a:endParaRPr lang="en-US"/>
           </a:p>
@@ -1592,7 +1591,7 @@
           <a:p>
             <a:fld id="{C485584D-7D79-4248-9986-4CA35242F944}" type="datetimeFigureOut">
               <a:rPr lang="en-US" smtClean="0"/>
-              <a:t>1/13/24</a:t>
+              <a:t>1/14/24</a:t>
             </a:fld>
             <a:endParaRPr lang="en-US"/>
           </a:p>
@@ -1706,7 +1705,7 @@
           <a:p>
             <a:fld id="{C485584D-7D79-4248-9986-4CA35242F944}" type="datetimeFigureOut">
               <a:rPr lang="en-US" smtClean="0"/>
-              <a:t>1/13/24</a:t>
+              <a:t>1/14/24</a:t>
             </a:fld>
             <a:endParaRPr lang="en-US"/>
           </a:p>
@@ -2305,7 +2304,7 @@
           <a:p>
             <a:fld id="{C485584D-7D79-4248-9986-4CA35242F944}" type="datetimeFigureOut">
               <a:rPr lang="en-US" smtClean="0"/>
-              <a:t>1/13/24</a:t>
+              <a:t>1/14/24</a:t>
             </a:fld>
             <a:endParaRPr lang="en-US"/>
           </a:p>
@@ -2722,7 +2721,7 @@
           <a:p>
             <a:fld id="{C485584D-7D79-4248-9986-4CA35242F944}" type="datetimeFigureOut">
               <a:rPr lang="en-US" smtClean="0"/>
-              <a:t>1/13/24</a:t>
+              <a:t>1/14/24</a:t>
             </a:fld>
             <a:endParaRPr lang="en-US"/>
           </a:p>
@@ -2864,7 +2863,7 @@
           <a:p>
             <a:fld id="{C485584D-7D79-4248-9986-4CA35242F944}" type="datetimeFigureOut">
               <a:rPr lang="en-US" smtClean="0"/>
-              <a:t>1/13/24</a:t>
+              <a:t>1/14/24</a:t>
             </a:fld>
             <a:endParaRPr lang="en-US"/>
           </a:p>
@@ -2978,7 +2977,7 @@
           <a:p>
             <a:fld id="{C485584D-7D79-4248-9986-4CA35242F944}" type="datetimeFigureOut">
               <a:rPr lang="en-US" smtClean="0"/>
-              <a:t>1/13/24</a:t>
+              <a:t>1/14/24</a:t>
             </a:fld>
             <a:endParaRPr lang="en-US"/>
           </a:p>
@@ -3290,7 +3289,7 @@
           <a:p>
             <a:fld id="{C485584D-7D79-4248-9986-4CA35242F944}" type="datetimeFigureOut">
               <a:rPr lang="en-US" smtClean="0"/>
-              <a:t>1/13/24</a:t>
+              <a:t>1/14/24</a:t>
             </a:fld>
             <a:endParaRPr lang="en-US"/>
           </a:p>
@@ -3582,7 +3581,7 @@
           <a:p>
             <a:fld id="{C485584D-7D79-4248-9986-4CA35242F944}" type="datetimeFigureOut">
               <a:rPr lang="en-US" smtClean="0"/>
-              <a:t>1/13/24</a:t>
+              <a:t>1/14/24</a:t>
             </a:fld>
             <a:endParaRPr lang="en-US"/>
           </a:p>
@@ -3870,7 +3869,7 @@
           <a:p>
             <a:fld id="{C485584D-7D79-4248-9986-4CA35242F944}" type="datetimeFigureOut">
               <a:rPr lang="en-US" smtClean="0"/>
-              <a:t>1/13/24</a:t>
+              <a:t>1/14/24</a:t>
             </a:fld>
             <a:endParaRPr lang="en-US"/>
           </a:p>
@@ -5673,94 +5672,6 @@
 <file path=ppt/slides/slide4.xml><?xml version="1.0" encoding="utf-8"?>
 <p:sld xmlns:a="http://schemas.openxmlformats.org/drawingml/2006/main" xmlns:r="http://schemas.openxmlformats.org/officeDocument/2006/relationships" xmlns:p="http://schemas.openxmlformats.org/presentationml/2006/main">
   <p:cSld>
-    <p:spTree>
-      <p:nvGrpSpPr>
-        <p:cNvPr id="1" name=""/>
-        <p:cNvGrpSpPr/>
-        <p:nvPr/>
-      </p:nvGrpSpPr>
-      <p:grpSpPr>
-        <a:xfrm>
-          <a:off x="0" y="0"/>
-          <a:ext cx="0" cy="0"/>
-          <a:chOff x="0" y="0"/>
-          <a:chExt cx="0" cy="0"/>
-        </a:xfrm>
-      </p:grpSpPr>
-      <p:sp>
-        <p:nvSpPr>
-          <p:cNvPr id="4" name="Pladsholder til slidenummer 3">
-            <a:extLst>
-              <a:ext uri="{FF2B5EF4-FFF2-40B4-BE49-F238E27FC236}">
-                <a16:creationId xmlns:a16="http://schemas.microsoft.com/office/drawing/2014/main" id="{6858FE36-4856-B97B-24AC-B259D5238DEE}"/>
-              </a:ext>
-            </a:extLst>
-          </p:cNvPr>
-          <p:cNvSpPr>
-            <a:spLocks noGrp="1"/>
-          </p:cNvSpPr>
-          <p:nvPr>
-            <p:ph type="sldNum" sz="quarter" idx="12"/>
-          </p:nvPr>
-        </p:nvSpPr>
-        <p:spPr/>
-        <p:txBody>
-          <a:bodyPr/>
-          <a:lstStyle/>
-          <a:p>
-            <a:fld id="{19590046-DA73-4BBF-84B5-C08E6F75191A}" type="slidenum">
-              <a:rPr lang="en-US" smtClean="0"/>
-              <a:t>4</a:t>
-            </a:fld>
-            <a:endParaRPr lang="en-US"/>
-          </a:p>
-        </p:txBody>
-      </p:sp>
-      <p:pic>
-        <p:nvPicPr>
-          <p:cNvPr id="5" name="Billede 5" descr="Et billede, der indeholder bord&#10;&#10;Beskrivelsen er genereret automatisk">
-            <a:extLst>
-              <a:ext uri="{FF2B5EF4-FFF2-40B4-BE49-F238E27FC236}">
-                <a16:creationId xmlns:a16="http://schemas.microsoft.com/office/drawing/2014/main" id="{C6A7E413-8B7D-E385-B1AC-8F47AB93B338}"/>
-              </a:ext>
-            </a:extLst>
-          </p:cNvPr>
-          <p:cNvPicPr>
-            <a:picLocks noChangeAspect="1"/>
-          </p:cNvPicPr>
-          <p:nvPr/>
-        </p:nvPicPr>
-        <p:blipFill rotWithShape="1">
-          <a:blip r:embed="rId2"/>
-          <a:srcRect t="8011" r="221" b="36338"/>
-          <a:stretch/>
-        </p:blipFill>
-        <p:spPr>
-          <a:xfrm>
-            <a:off x="1627" y="797170"/>
-            <a:ext cx="12188732" cy="5260132"/>
-          </a:xfrm>
-          <a:prstGeom prst="rect">
-            <a:avLst/>
-          </a:prstGeom>
-        </p:spPr>
-      </p:pic>
-    </p:spTree>
-    <p:extLst>
-      <p:ext uri="{BB962C8B-B14F-4D97-AF65-F5344CB8AC3E}">
-        <p14:creationId xmlns:p14="http://schemas.microsoft.com/office/powerpoint/2010/main" val="2201987919"/>
-      </p:ext>
-    </p:extLst>
-  </p:cSld>
-  <p:clrMapOvr>
-    <a:masterClrMapping/>
-  </p:clrMapOvr>
-</p:sld>
-</file>
-
-<file path=ppt/slides/slide5.xml><?xml version="1.0" encoding="utf-8"?>
-<p:sld xmlns:a="http://schemas.openxmlformats.org/drawingml/2006/main" xmlns:r="http://schemas.openxmlformats.org/officeDocument/2006/relationships" xmlns:p="http://schemas.openxmlformats.org/presentationml/2006/main">
-  <p:cSld>
     <p:bg>
       <p:bgPr>
         <a:solidFill>
@@ -5872,7 +5783,7 @@
             <a:fld id="{19590046-DA73-4BBF-84B5-C08E6F75191A}" type="slidenum">
               <a:rPr lang="en-US" smtClean="0"/>
               <a:pPr/>
-              <a:t>5</a:t>
+              <a:t>4</a:t>
             </a:fld>
             <a:endParaRPr lang="da-DK"/>
           </a:p>
@@ -5891,7 +5802,7 @@
 </p:sld>
 </file>
 
-<file path=ppt/slides/slide6.xml><?xml version="1.0" encoding="utf-8"?>
+<file path=ppt/slides/slide5.xml><?xml version="1.0" encoding="utf-8"?>
 <p:sld xmlns:a="http://schemas.openxmlformats.org/drawingml/2006/main" xmlns:r="http://schemas.openxmlformats.org/officeDocument/2006/relationships" xmlns:p="http://schemas.openxmlformats.org/presentationml/2006/main">
   <p:cSld>
     <p:bg>
@@ -7068,7 +6979,7 @@
                   <a:spcPts val="600"/>
                 </a:spcAft>
               </a:pPr>
-              <a:t>6</a:t>
+              <a:t>5</a:t>
             </a:fld>
             <a:endParaRPr lang="en-US"/>
           </a:p>
@@ -7291,7 +7202,7 @@
 </p:sld>
 </file>
 
-<file path=ppt/slides/slide7.xml><?xml version="1.0" encoding="utf-8"?>
+<file path=ppt/slides/slide6.xml><?xml version="1.0" encoding="utf-8"?>
 <p:sld xmlns:a="http://schemas.openxmlformats.org/drawingml/2006/main" xmlns:r="http://schemas.openxmlformats.org/officeDocument/2006/relationships" xmlns:p="http://schemas.openxmlformats.org/presentationml/2006/main">
   <p:cSld>
     <p:spTree>
@@ -7460,7 +7371,7 @@
             <a:fld id="{19590046-DA73-4BBF-84B5-C08E6F75191A}" type="slidenum">
               <a:rPr lang="en-US"/>
               <a:pPr/>
-              <a:t>7</a:t>
+              <a:t>6</a:t>
             </a:fld>
             <a:endParaRPr lang="da-DK"/>
           </a:p>
@@ -7976,12 +7887,14 @@
 </file>
 
 <file path=customXml/item1.xml><?xml version="1.0" encoding="utf-8"?>
-<?mso-contentType ?>
-<FormTemplates xmlns="http://schemas.microsoft.com/sharepoint/v3/contenttype/forms">
-  <Display>DocumentLibraryForm</Display>
-  <Edit>DocumentLibraryForm</Edit>
-  <New>DocumentLibraryForm</New>
-</FormTemplates>
+<p:properties xmlns:p="http://schemas.microsoft.com/office/2006/metadata/properties" xmlns:xsi="http://www.w3.org/2001/XMLSchema-instance" xmlns:pc="http://schemas.microsoft.com/office/infopath/2007/PartnerControls">
+  <documentManagement>
+    <lcf76f155ced4ddcb4097134ff3c332f xmlns="03164729-8feb-404a-b1df-77701d9348ef">
+      <Terms xmlns="http://schemas.microsoft.com/office/infopath/2007/PartnerControls"/>
+    </lcf76f155ced4ddcb4097134ff3c332f>
+    <TaxCatchAll xmlns="5a5ea198-c702-42f1-bd85-0fd891e8928c" xsi:nil="true"/>
+  </documentManagement>
+</p:properties>
 </file>
 
 <file path=customXml/item2.xml><?xml version="1.0" encoding="utf-8"?>
@@ -8180,20 +8093,21 @@
 </file>
 
 <file path=customXml/item3.xml><?xml version="1.0" encoding="utf-8"?>
-<p:properties xmlns:p="http://schemas.microsoft.com/office/2006/metadata/properties" xmlns:xsi="http://www.w3.org/2001/XMLSchema-instance" xmlns:pc="http://schemas.microsoft.com/office/infopath/2007/PartnerControls">
-  <documentManagement>
-    <lcf76f155ced4ddcb4097134ff3c332f xmlns="03164729-8feb-404a-b1df-77701d9348ef">
-      <Terms xmlns="http://schemas.microsoft.com/office/infopath/2007/PartnerControls"/>
-    </lcf76f155ced4ddcb4097134ff3c332f>
-    <TaxCatchAll xmlns="5a5ea198-c702-42f1-bd85-0fd891e8928c" xsi:nil="true"/>
-  </documentManagement>
-</p:properties>
+<?mso-contentType ?>
+<FormTemplates xmlns="http://schemas.microsoft.com/sharepoint/v3/contenttype/forms">
+  <Display>DocumentLibraryForm</Display>
+  <Edit>DocumentLibraryForm</Edit>
+  <New>DocumentLibraryForm</New>
+</FormTemplates>
 </file>
 
 <file path=customXml/itemProps1.xml><?xml version="1.0" encoding="utf-8"?>
-<ds:datastoreItem xmlns:ds="http://schemas.openxmlformats.org/officeDocument/2006/customXml" ds:itemID="{94AE610E-5E80-4BE4-9F3C-0C02692ACDD0}">
+<ds:datastoreItem xmlns:ds="http://schemas.openxmlformats.org/officeDocument/2006/customXml" ds:itemID="{5A8D0197-0436-48C7-9165-EA60285EF138}">
   <ds:schemaRefs>
-    <ds:schemaRef ds:uri="http://schemas.microsoft.com/sharepoint/v3/contenttype/forms"/>
+    <ds:schemaRef ds:uri="03164729-8feb-404a-b1df-77701d9348ef"/>
+    <ds:schemaRef ds:uri="5a5ea198-c702-42f1-bd85-0fd891e8928c"/>
+    <ds:schemaRef ds:uri="http://schemas.microsoft.com/office/2006/metadata/properties"/>
+    <ds:schemaRef ds:uri="http://schemas.microsoft.com/office/infopath/2007/PartnerControls"/>
   </ds:schemaRefs>
 </ds:datastoreItem>
 </file>
@@ -8218,12 +8132,9 @@
 </file>
 
 <file path=customXml/itemProps3.xml><?xml version="1.0" encoding="utf-8"?>
-<ds:datastoreItem xmlns:ds="http://schemas.openxmlformats.org/officeDocument/2006/customXml" ds:itemID="{5A8D0197-0436-48C7-9165-EA60285EF138}">
+<ds:datastoreItem xmlns:ds="http://schemas.openxmlformats.org/officeDocument/2006/customXml" ds:itemID="{94AE610E-5E80-4BE4-9F3C-0C02692ACDD0}">
   <ds:schemaRefs>
-    <ds:schemaRef ds:uri="03164729-8feb-404a-b1df-77701d9348ef"/>
-    <ds:schemaRef ds:uri="5a5ea198-c702-42f1-bd85-0fd891e8928c"/>
-    <ds:schemaRef ds:uri="http://schemas.microsoft.com/office/2006/metadata/properties"/>
-    <ds:schemaRef ds:uri="http://schemas.microsoft.com/office/infopath/2007/PartnerControls"/>
+    <ds:schemaRef ds:uri="http://schemas.microsoft.com/sharepoint/v3/contenttype/forms"/>
   </ds:schemaRefs>
 </ds:datastoreItem>
 </file>
</xml_diff>